<commit_message>
qr code to github repo added to ppt
</commit_message>
<xml_diff>
--- a/SQL_Masterclass_UoAIBSS.pptx
+++ b/SQL_Masterclass_UoAIBSS.pptx
@@ -48,6 +48,7 @@
     <p:sldId id="293" r:id="rId45"/>
     <p:sldId id="294" r:id="rId46"/>
     <p:sldId id="295" r:id="rId47"/>
+    <p:sldId id="296" r:id="rId48"/>
   </p:sldIdLst>
   <p:sldSz cx="13004800" cy="9753600"/>
   <p:notesSz cx="6858000" cy="9144000"/>
@@ -3798,8 +3799,8 @@
           <p:nvPr/>
         </p:nvGraphicFramePr>
         <p:xfrm>
-          <a:off x="4000499" y="2774950"/>
-          <a:ext cx="5016501" cy="5715000"/>
+          <a:off x="4000500" y="2774950"/>
+          <a:ext cx="5016500" cy="5715000"/>
         </p:xfrm>
         <a:graphic xmlns:a="http://schemas.openxmlformats.org/drawingml/2006/main">
           <a:graphicData uri="http://schemas.openxmlformats.org/drawingml/2006/table">
@@ -5714,8 +5715,8 @@
         </p:blipFill>
         <p:spPr>
           <a:xfrm>
-            <a:off x="6844666" y="1843791"/>
-            <a:ext cx="5436868" cy="7073048"/>
+            <a:off x="6844665" y="1843791"/>
+            <a:ext cx="5436869" cy="7073048"/>
           </a:xfrm>
           <a:prstGeom prst="rect">
             <a:avLst/>
@@ -6156,8 +6157,8 @@
         </p:blipFill>
         <p:spPr>
           <a:xfrm>
-            <a:off x="5535429" y="5738101"/>
-            <a:ext cx="2870880" cy="2870879"/>
+            <a:off x="5535429" y="5738100"/>
+            <a:ext cx="2870880" cy="2870880"/>
           </a:xfrm>
           <a:prstGeom prst="rect">
             <a:avLst/>
@@ -10190,7 +10191,7 @@
       </p:grpSpPr>
       <p:sp>
         <p:nvSpPr>
-          <p:cNvPr id="284" name="Got Questions?"/>
+          <p:cNvPr id="284" name="Github Repository"/>
           <p:cNvSpPr txBox="1"/>
           <p:nvPr>
             <p:ph type="title"/>
@@ -10207,70 +10208,14 @@
           <a:p>
             <a:pPr/>
             <a:r>
-              <a:t>Got Questions?</a:t>
-            </a:r>
-          </a:p>
-        </p:txBody>
-      </p:sp>
-      <p:sp>
-        <p:nvSpPr>
-          <p:cNvPr id="285" name="Ask here or Reach out…"/>
-          <p:cNvSpPr txBox="1"/>
-          <p:nvPr>
-            <p:ph type="body" sz="quarter" idx="1"/>
-          </p:nvPr>
-        </p:nvSpPr>
-        <p:spPr>
-          <a:prstGeom prst="rect">
-            <a:avLst/>
-          </a:prstGeom>
-        </p:spPr>
-        <p:txBody>
-          <a:bodyPr/>
-          <a:lstStyle/>
-          <a:p>
-            <a:pPr/>
-            <a:r>
-              <a:t>Ask here or Reach out</a:t>
-            </a:r>
-          </a:p>
-          <a:p>
-            <a:pPr algn="l">
-              <a:defRPr b="1" i="0" sz="3100"/>
-            </a:pPr>
-            <a:r>
-              <a:t>Website: manvimadan.com</a:t>
-            </a:r>
-          </a:p>
-          <a:p>
-            <a:pPr algn="l">
-              <a:defRPr b="1" i="0" sz="3100"/>
-            </a:pPr>
-            <a:r>
-              <a:t>LinkedIn: </a:t>
-            </a:r>
-          </a:p>
-          <a:p>
-            <a:pPr algn="l">
-              <a:defRPr b="1" i="0" sz="3100"/>
-            </a:pPr>
-            <a:r>
-              <a:t>Twitter: </a:t>
-            </a:r>
-          </a:p>
-          <a:p>
-            <a:pPr algn="l">
-              <a:defRPr b="1" i="0" sz="3100"/>
-            </a:pPr>
-            <a:r>
-              <a:t>IG:</a:t>
-            </a:r>
-          </a:p>
-        </p:txBody>
-      </p:sp>
-      <p:sp>
-        <p:nvSpPr>
-          <p:cNvPr id="286" name="Slide Number"/>
+              <a:t>Github Repository</a:t>
+            </a:r>
+          </a:p>
+        </p:txBody>
+      </p:sp>
+      <p:sp>
+        <p:nvSpPr>
+          <p:cNvPr id="285" name="Slide Number"/>
           <p:cNvSpPr txBox="1"/>
           <p:nvPr>
             <p:ph type="sldNum" sz="quarter" idx="2"/>
@@ -10297,7 +10242,7 @@
       </p:sp>
       <p:pic>
         <p:nvPicPr>
-          <p:cNvPr id="287" name="question_mark_PNG6.png" descr="question_mark_PNG6.png"/>
+          <p:cNvPr id="286" name="Screen Shot 2021-04-06 at 9.26.57 PM.png" descr="Screen Shot 2021-04-06 at 9.26.57 PM.png"/>
           <p:cNvPicPr>
             <a:picLocks noChangeAspect="1"/>
           </p:cNvPicPr>
@@ -10313,8 +10258,170 @@
         </p:blipFill>
         <p:spPr>
           <a:xfrm>
+            <a:off x="6015925" y="1450098"/>
+            <a:ext cx="6477001" cy="6263473"/>
+          </a:xfrm>
+          <a:prstGeom prst="rect">
+            <a:avLst/>
+          </a:prstGeom>
+          <a:ln w="12700">
+            <a:miter lim="400000"/>
+          </a:ln>
+        </p:spPr>
+      </p:pic>
+    </p:spTree>
+  </p:cSld>
+  <p:clrMapOvr>
+    <a:masterClrMapping/>
+  </p:clrMapOvr>
+  <p:transition xmlns:p14="http://schemas.microsoft.com/office/powerpoint/2010/main" spd="med" advClick="1"/>
+</p:sld>
+</file>
+
+<file path=ppt/slides/slide41.xml><?xml version="1.0" encoding="utf-8"?>
+<p:sld xmlns:a="http://schemas.openxmlformats.org/drawingml/2006/main" xmlns:r="http://schemas.openxmlformats.org/officeDocument/2006/relationships" xmlns:p="http://schemas.openxmlformats.org/presentationml/2006/main" xmlns:m="http://schemas.openxmlformats.org/officeDocument/2006/math" xmlns:a14="http://schemas.microsoft.com/office/drawing/2010/main" showMasterSp="1" showMasterPhAnim="1">
+  <p:cSld>
+    <p:spTree>
+      <p:nvGrpSpPr>
+        <p:cNvPr id="1" name=""/>
+        <p:cNvGrpSpPr/>
+        <p:nvPr/>
+      </p:nvGrpSpPr>
+      <p:grpSpPr>
+        <a:xfrm>
+          <a:off x="0" y="0"/>
+          <a:ext cx="0" cy="0"/>
+          <a:chOff x="0" y="0"/>
+          <a:chExt cx="0" cy="0"/>
+        </a:xfrm>
+      </p:grpSpPr>
+      <p:sp>
+        <p:nvSpPr>
+          <p:cNvPr id="288" name="Got Questions?"/>
+          <p:cNvSpPr txBox="1"/>
+          <p:nvPr>
+            <p:ph type="title"/>
+          </p:nvPr>
+        </p:nvSpPr>
+        <p:spPr>
+          <a:prstGeom prst="rect">
+            <a:avLst/>
+          </a:prstGeom>
+        </p:spPr>
+        <p:txBody>
+          <a:bodyPr/>
+          <a:lstStyle/>
+          <a:p>
+            <a:pPr/>
+            <a:r>
+              <a:t>Got Questions?</a:t>
+            </a:r>
+          </a:p>
+        </p:txBody>
+      </p:sp>
+      <p:sp>
+        <p:nvSpPr>
+          <p:cNvPr id="289" name="Ask here or Reach out…"/>
+          <p:cNvSpPr txBox="1"/>
+          <p:nvPr>
+            <p:ph type="body" sz="quarter" idx="1"/>
+          </p:nvPr>
+        </p:nvSpPr>
+        <p:spPr>
+          <a:prstGeom prst="rect">
+            <a:avLst/>
+          </a:prstGeom>
+        </p:spPr>
+        <p:txBody>
+          <a:bodyPr/>
+          <a:lstStyle/>
+          <a:p>
+            <a:pPr/>
+            <a:r>
+              <a:t>Ask here or Reach out</a:t>
+            </a:r>
+          </a:p>
+          <a:p>
+            <a:pPr algn="l">
+              <a:defRPr b="1" i="0" sz="3100"/>
+            </a:pPr>
+            <a:r>
+              <a:t>Website: manvimadan.com</a:t>
+            </a:r>
+          </a:p>
+          <a:p>
+            <a:pPr algn="l">
+              <a:defRPr b="1" i="0" sz="3100"/>
+            </a:pPr>
+            <a:r>
+              <a:t>LinkedIn: </a:t>
+            </a:r>
+          </a:p>
+          <a:p>
+            <a:pPr algn="l">
+              <a:defRPr b="1" i="0" sz="3100"/>
+            </a:pPr>
+            <a:r>
+              <a:t>Twitter: </a:t>
+            </a:r>
+          </a:p>
+          <a:p>
+            <a:pPr algn="l">
+              <a:defRPr b="1" i="0" sz="3100"/>
+            </a:pPr>
+            <a:r>
+              <a:t>IG:</a:t>
+            </a:r>
+          </a:p>
+        </p:txBody>
+      </p:sp>
+      <p:sp>
+        <p:nvSpPr>
+          <p:cNvPr id="290" name="Slide Number"/>
+          <p:cNvSpPr txBox="1"/>
+          <p:nvPr>
+            <p:ph type="sldNum" sz="quarter" idx="2"/>
+          </p:nvPr>
+        </p:nvSpPr>
+        <p:spPr>
+          <a:prstGeom prst="rect">
+            <a:avLst/>
+          </a:prstGeom>
+          <a:extLst>
+            <a:ext uri="{C572A759-6A51-4108-AA02-DFA0A04FC94B}">
+              <ma14:wrappingTextBoxFlag xmlns:ma14="http://schemas.microsoft.com/office/mac/drawingml/2011/main" val="1"/>
+            </a:ext>
+          </a:extLst>
+        </p:spPr>
+        <p:txBody>
+          <a:bodyPr/>
+          <a:lstStyle/>
+          <a:p>
+            <a:pPr/>
+            <a:fld id="{86CB4B4D-7CA3-9044-876B-883B54F8677D}" type="slidenum"/>
+          </a:p>
+        </p:txBody>
+      </p:sp>
+      <p:pic>
+        <p:nvPicPr>
+          <p:cNvPr id="291" name="question_mark_PNG6.png" descr="question_mark_PNG6.png"/>
+          <p:cNvPicPr>
+            <a:picLocks noChangeAspect="1"/>
+          </p:cNvPicPr>
+          <p:nvPr/>
+        </p:nvPicPr>
+        <p:blipFill>
+          <a:blip r:embed="rId2">
+            <a:extLst/>
+          </a:blip>
+          <a:stretch>
+            <a:fillRect/>
+          </a:stretch>
+        </p:blipFill>
+        <p:spPr>
+          <a:xfrm>
             <a:off x="6898219" y="236051"/>
-            <a:ext cx="6224275" cy="9753601"/>
+            <a:ext cx="6224274" cy="9753601"/>
           </a:xfrm>
           <a:prstGeom prst="rect">
             <a:avLst/>
@@ -10370,7 +10477,7 @@
         </p:blipFill>
         <p:spPr>
           <a:xfrm>
-            <a:off x="6794677" y="1561861"/>
+            <a:off x="6794676" y="1561861"/>
             <a:ext cx="5231816" cy="6629878"/>
           </a:xfrm>
           <a:prstGeom prst="rect">
@@ -11197,7 +11304,7 @@
         </p:nvSpPr>
         <p:spPr>
           <a:xfrm>
-            <a:off x="963883" y="8169853"/>
+            <a:off x="963883" y="8169854"/>
             <a:ext cx="11480801" cy="355601"/>
           </a:xfrm>
           <a:prstGeom prst="rect">

</xml_diff>